<commit_message>
checked the rest of the code
</commit_message>
<xml_diff>
--- a/Plots/Network analysis summary.pptx
+++ b/Plots/Network analysis summary.pptx
@@ -226,7 +226,7 @@
           <a:p>
             <a:fld id="{0E83F2AA-93BB-C94E-9A80-F08CDF2EBA47}" type="datetimeFigureOut">
               <a:rPr lang="en-US" smtClean="0"/>
-              <a:t>7/29/21</a:t>
+              <a:t>8/6/21</a:t>
             </a:fld>
             <a:endParaRPr lang="en-US"/>
           </a:p>
@@ -708,7 +708,7 @@
           <a:p>
             <a:fld id="{554E7DDD-058B-1841-B94D-DB98A383CD5A}" type="datetimeFigureOut">
               <a:rPr lang="en-US" smtClean="0"/>
-              <a:t>7/29/21</a:t>
+              <a:t>8/6/21</a:t>
             </a:fld>
             <a:endParaRPr lang="en-US"/>
           </a:p>
@@ -878,7 +878,7 @@
           <a:p>
             <a:fld id="{554E7DDD-058B-1841-B94D-DB98A383CD5A}" type="datetimeFigureOut">
               <a:rPr lang="en-US" smtClean="0"/>
-              <a:t>7/29/21</a:t>
+              <a:t>8/6/21</a:t>
             </a:fld>
             <a:endParaRPr lang="en-US"/>
           </a:p>
@@ -1058,7 +1058,7 @@
           <a:p>
             <a:fld id="{554E7DDD-058B-1841-B94D-DB98A383CD5A}" type="datetimeFigureOut">
               <a:rPr lang="en-US" smtClean="0"/>
-              <a:t>7/29/21</a:t>
+              <a:t>8/6/21</a:t>
             </a:fld>
             <a:endParaRPr lang="en-US"/>
           </a:p>
@@ -1228,7 +1228,7 @@
           <a:p>
             <a:fld id="{554E7DDD-058B-1841-B94D-DB98A383CD5A}" type="datetimeFigureOut">
               <a:rPr lang="en-US" smtClean="0"/>
-              <a:t>7/29/21</a:t>
+              <a:t>8/6/21</a:t>
             </a:fld>
             <a:endParaRPr lang="en-US"/>
           </a:p>
@@ -1474,7 +1474,7 @@
           <a:p>
             <a:fld id="{554E7DDD-058B-1841-B94D-DB98A383CD5A}" type="datetimeFigureOut">
               <a:rPr lang="en-US" smtClean="0"/>
-              <a:t>7/29/21</a:t>
+              <a:t>8/6/21</a:t>
             </a:fld>
             <a:endParaRPr lang="en-US"/>
           </a:p>
@@ -1706,7 +1706,7 @@
           <a:p>
             <a:fld id="{554E7DDD-058B-1841-B94D-DB98A383CD5A}" type="datetimeFigureOut">
               <a:rPr lang="en-US" smtClean="0"/>
-              <a:t>7/29/21</a:t>
+              <a:t>8/6/21</a:t>
             </a:fld>
             <a:endParaRPr lang="en-US"/>
           </a:p>
@@ -2073,7 +2073,7 @@
           <a:p>
             <a:fld id="{554E7DDD-058B-1841-B94D-DB98A383CD5A}" type="datetimeFigureOut">
               <a:rPr lang="en-US" smtClean="0"/>
-              <a:t>7/29/21</a:t>
+              <a:t>8/6/21</a:t>
             </a:fld>
             <a:endParaRPr lang="en-US"/>
           </a:p>
@@ -2191,7 +2191,7 @@
           <a:p>
             <a:fld id="{554E7DDD-058B-1841-B94D-DB98A383CD5A}" type="datetimeFigureOut">
               <a:rPr lang="en-US" smtClean="0"/>
-              <a:t>7/29/21</a:t>
+              <a:t>8/6/21</a:t>
             </a:fld>
             <a:endParaRPr lang="en-US"/>
           </a:p>
@@ -2286,7 +2286,7 @@
           <a:p>
             <a:fld id="{554E7DDD-058B-1841-B94D-DB98A383CD5A}" type="datetimeFigureOut">
               <a:rPr lang="en-US" smtClean="0"/>
-              <a:t>7/29/21</a:t>
+              <a:t>8/6/21</a:t>
             </a:fld>
             <a:endParaRPr lang="en-US"/>
           </a:p>
@@ -2563,7 +2563,7 @@
           <a:p>
             <a:fld id="{554E7DDD-058B-1841-B94D-DB98A383CD5A}" type="datetimeFigureOut">
               <a:rPr lang="en-US" smtClean="0"/>
-              <a:t>7/29/21</a:t>
+              <a:t>8/6/21</a:t>
             </a:fld>
             <a:endParaRPr lang="en-US"/>
           </a:p>
@@ -2820,7 +2820,7 @@
           <a:p>
             <a:fld id="{554E7DDD-058B-1841-B94D-DB98A383CD5A}" type="datetimeFigureOut">
               <a:rPr lang="en-US" smtClean="0"/>
-              <a:t>7/29/21</a:t>
+              <a:t>8/6/21</a:t>
             </a:fld>
             <a:endParaRPr lang="en-US"/>
           </a:p>
@@ -3033,7 +3033,7 @@
           <a:p>
             <a:fld id="{554E7DDD-058B-1841-B94D-DB98A383CD5A}" type="datetimeFigureOut">
               <a:rPr lang="en-US" smtClean="0"/>
-              <a:t>7/29/21</a:t>
+              <a:t>8/6/21</a:t>
             </a:fld>
             <a:endParaRPr lang="en-US"/>
           </a:p>
@@ -3440,6 +3440,44 @@
       </p:grpSpPr>
       <p:pic>
         <p:nvPicPr>
+          <p:cNvPr id="10" name="Picture 9" descr="Map&#10;&#10;Description automatically generated with low confidence">
+            <a:extLst>
+              <a:ext uri="{FF2B5EF4-FFF2-40B4-BE49-F238E27FC236}">
+                <a16:creationId xmlns:a16="http://schemas.microsoft.com/office/drawing/2014/main" id="{C0655305-34C5-5143-B4E8-1185A25636AE}"/>
+              </a:ext>
+            </a:extLst>
+          </p:cNvPr>
+          <p:cNvPicPr>
+            <a:picLocks noChangeAspect="1"/>
+          </p:cNvPicPr>
+          <p:nvPr/>
+        </p:nvPicPr>
+        <p:blipFill>
+          <a:blip r:embed="rId3"/>
+          <a:stretch>
+            <a:fillRect/>
+          </a:stretch>
+        </p:blipFill>
+        <p:spPr>
+          <a:xfrm>
+            <a:off x="405299" y="16309315"/>
+            <a:ext cx="12138557" cy="10924701"/>
+          </a:xfrm>
+          <a:prstGeom prst="rect">
+            <a:avLst/>
+          </a:prstGeom>
+          <a:ln>
+            <a:solidFill>
+              <a:schemeClr val="tx1">
+                <a:lumMod val="50000"/>
+                <a:lumOff val="50000"/>
+              </a:schemeClr>
+            </a:solidFill>
+          </a:ln>
+        </p:spPr>
+      </p:pic>
+      <p:pic>
+        <p:nvPicPr>
           <p:cNvPr id="6" name="Picture 5" descr="A picture containing map&#10;&#10;Description automatically generated">
             <a:extLst>
               <a:ext uri="{FF2B5EF4-FFF2-40B4-BE49-F238E27FC236}">
@@ -3453,7 +3491,7 @@
           <p:nvPr/>
         </p:nvPicPr>
         <p:blipFill>
-          <a:blip r:embed="rId3"/>
+          <a:blip r:embed="rId4"/>
           <a:stretch>
             <a:fillRect/>
           </a:stretch>
@@ -3491,7 +3529,7 @@
           <p:nvPr/>
         </p:nvPicPr>
         <p:blipFill>
-          <a:blip r:embed="rId4"/>
+          <a:blip r:embed="rId5"/>
           <a:stretch>
             <a:fillRect/>
           </a:stretch>
@@ -3689,44 +3727,6 @@
           </a:p>
         </p:txBody>
       </p:sp>
-      <p:pic>
-        <p:nvPicPr>
-          <p:cNvPr id="10" name="Picture 9" descr="Map&#10;&#10;Description automatically generated with low confidence">
-            <a:extLst>
-              <a:ext uri="{FF2B5EF4-FFF2-40B4-BE49-F238E27FC236}">
-                <a16:creationId xmlns:a16="http://schemas.microsoft.com/office/drawing/2014/main" id="{C0655305-34C5-5143-B4E8-1185A25636AE}"/>
-              </a:ext>
-            </a:extLst>
-          </p:cNvPr>
-          <p:cNvPicPr>
-            <a:picLocks noChangeAspect="1"/>
-          </p:cNvPicPr>
-          <p:nvPr/>
-        </p:nvPicPr>
-        <p:blipFill>
-          <a:blip r:embed="rId5"/>
-          <a:stretch>
-            <a:fillRect/>
-          </a:stretch>
-        </p:blipFill>
-        <p:spPr>
-          <a:xfrm>
-            <a:off x="405299" y="16309315"/>
-            <a:ext cx="12138557" cy="10924701"/>
-          </a:xfrm>
-          <a:prstGeom prst="rect">
-            <a:avLst/>
-          </a:prstGeom>
-          <a:ln>
-            <a:solidFill>
-              <a:schemeClr val="tx1">
-                <a:lumMod val="50000"/>
-                <a:lumOff val="50000"/>
-              </a:schemeClr>
-            </a:solidFill>
-          </a:ln>
-        </p:spPr>
-      </p:pic>
       <p:pic>
         <p:nvPicPr>
           <p:cNvPr id="14" name="Picture 13" descr="Map&#10;&#10;Description automatically generated">
@@ -3765,6 +3765,155 @@
           </a:ln>
         </p:spPr>
       </p:pic>
+      <p:sp>
+        <p:nvSpPr>
+          <p:cNvPr id="2" name="Oval 1">
+            <a:extLst>
+              <a:ext uri="{FF2B5EF4-FFF2-40B4-BE49-F238E27FC236}">
+                <a16:creationId xmlns:a16="http://schemas.microsoft.com/office/drawing/2014/main" id="{B2834CE2-937B-724B-8234-A6815D8012C4}"/>
+              </a:ext>
+            </a:extLst>
+          </p:cNvPr>
+          <p:cNvSpPr/>
+          <p:nvPr/>
+        </p:nvSpPr>
+        <p:spPr>
+          <a:xfrm>
+            <a:off x="2697734" y="20975974"/>
+            <a:ext cx="548640" cy="548640"/>
+          </a:xfrm>
+          <a:prstGeom prst="ellipse">
+            <a:avLst/>
+          </a:prstGeom>
+          <a:solidFill>
+            <a:schemeClr val="bg1">
+              <a:lumMod val="65000"/>
+            </a:schemeClr>
+          </a:solidFill>
+          <a:ln>
+            <a:solidFill>
+              <a:schemeClr val="tx1"/>
+            </a:solidFill>
+          </a:ln>
+        </p:spPr>
+        <p:style>
+          <a:lnRef idx="2">
+            <a:schemeClr val="accent1">
+              <a:shade val="50000"/>
+            </a:schemeClr>
+          </a:lnRef>
+          <a:fillRef idx="1">
+            <a:schemeClr val="accent1"/>
+          </a:fillRef>
+          <a:effectRef idx="0">
+            <a:schemeClr val="accent1"/>
+          </a:effectRef>
+          <a:fontRef idx="minor">
+            <a:schemeClr val="lt1"/>
+          </a:fontRef>
+        </p:style>
+        <p:txBody>
+          <a:bodyPr rtlCol="0" anchor="ctr"/>
+          <a:lstStyle/>
+          <a:p>
+            <a:pPr algn="ctr"/>
+            <a:endParaRPr lang="en-US"/>
+          </a:p>
+        </p:txBody>
+      </p:sp>
+      <p:sp>
+        <p:nvSpPr>
+          <p:cNvPr id="5" name="Arc 4">
+            <a:extLst>
+              <a:ext uri="{FF2B5EF4-FFF2-40B4-BE49-F238E27FC236}">
+                <a16:creationId xmlns:a16="http://schemas.microsoft.com/office/drawing/2014/main" id="{99C83EF3-40C9-F249-8E6C-827E0BD03200}"/>
+              </a:ext>
+            </a:extLst>
+          </p:cNvPr>
+          <p:cNvSpPr/>
+          <p:nvPr/>
+        </p:nvSpPr>
+        <p:spPr>
+          <a:xfrm rot="16422651">
+            <a:off x="4800657" y="21262537"/>
+            <a:ext cx="420887" cy="1310398"/>
+          </a:xfrm>
+          <a:prstGeom prst="arc">
+            <a:avLst>
+              <a:gd name="adj1" fmla="val 16200000"/>
+              <a:gd name="adj2" fmla="val 16129647"/>
+            </a:avLst>
+          </a:prstGeom>
+          <a:ln w="85725">
+            <a:solidFill>
+              <a:schemeClr val="accent1">
+                <a:alpha val="75000"/>
+              </a:schemeClr>
+            </a:solidFill>
+            <a:tailEnd type="stealth" w="med" len="med"/>
+          </a:ln>
+        </p:spPr>
+        <p:style>
+          <a:lnRef idx="1">
+            <a:schemeClr val="accent1"/>
+          </a:lnRef>
+          <a:fillRef idx="0">
+            <a:schemeClr val="accent1"/>
+          </a:fillRef>
+          <a:effectRef idx="0">
+            <a:schemeClr val="accent1"/>
+          </a:effectRef>
+          <a:fontRef idx="minor">
+            <a:schemeClr val="tx1"/>
+          </a:fontRef>
+        </p:style>
+        <p:txBody>
+          <a:bodyPr rtlCol="0" anchor="ctr"/>
+          <a:lstStyle/>
+          <a:p>
+            <a:pPr algn="ctr"/>
+            <a:endParaRPr lang="en-US"/>
+          </a:p>
+        </p:txBody>
+      </p:sp>
+      <p:sp>
+        <p:nvSpPr>
+          <p:cNvPr id="7" name="TextBox 6">
+            <a:extLst>
+              <a:ext uri="{FF2B5EF4-FFF2-40B4-BE49-F238E27FC236}">
+                <a16:creationId xmlns:a16="http://schemas.microsoft.com/office/drawing/2014/main" id="{9757BDD0-BFD0-B04D-B835-4BE097DAD3A0}"/>
+              </a:ext>
+            </a:extLst>
+          </p:cNvPr>
+          <p:cNvSpPr txBox="1"/>
+          <p:nvPr/>
+        </p:nvSpPr>
+        <p:spPr>
+          <a:xfrm>
+            <a:off x="5630551" y="21616146"/>
+            <a:ext cx="1264257" cy="553998"/>
+          </a:xfrm>
+          <a:prstGeom prst="rect">
+            <a:avLst/>
+          </a:prstGeom>
+          <a:noFill/>
+        </p:spPr>
+        <p:txBody>
+          <a:bodyPr wrap="square" rtlCol="0">
+            <a:spAutoFit/>
+          </a:bodyPr>
+          <a:lstStyle/>
+          <a:p>
+            <a:r>
+              <a:rPr lang="en-US" sz="3000" dirty="0">
+                <a:latin typeface="Arial" panose="020B0604020202020204" pitchFamily="34" charset="0"/>
+                <a:cs typeface="Arial" panose="020B0604020202020204" pitchFamily="34" charset="0"/>
+              </a:rPr>
+              <a:t>0.97</a:t>
+            </a:r>
+          </a:p>
+        </p:txBody>
+      </p:sp>
     </p:spTree>
     <p:extLst>
       <p:ext uri="{BB962C8B-B14F-4D97-AF65-F5344CB8AC3E}">

</xml_diff>